<commit_message>
spunti di presentazione di Tommaso
</commit_message>
<xml_diff>
--- a/documentation/presentation.pptx
+++ b/documentation/presentation.pptx
@@ -21095,212 +21095,1049 @@
           </a:p>
         </p:txBody>
       </p:sp>
-      <p:sp>
-        <p:nvSpPr>
-          <p:cNvPr id="2" name="Content Placeholder 2">
+      <p:graphicFrame>
+        <p:nvGraphicFramePr>
+          <p:cNvPr id="13" name="Table 12">
             <a:extLst>
               <a:ext uri="{FF2B5EF4-FFF2-40B4-BE49-F238E27FC236}">
-                <a16:creationId xmlns:a16="http://schemas.microsoft.com/office/drawing/2014/main" id="{AF38A505-5569-961A-20BE-5DB4C3A8AA0E}"/>
+                <a16:creationId xmlns:a16="http://schemas.microsoft.com/office/drawing/2014/main" id="{A2913B80-2D2B-5967-1ED6-90975F2E6CB2}"/>
               </a:ext>
             </a:extLst>
           </p:cNvPr>
-          <p:cNvSpPr txBox="1">
-            <a:spLocks/>
-          </p:cNvSpPr>
-          <p:nvPr/>
-        </p:nvSpPr>
-        <p:spPr>
-          <a:xfrm>
-            <a:off x="876300" y="1544015"/>
-            <a:ext cx="10439400" cy="4139154"/>
-          </a:xfrm>
-          <a:prstGeom prst="rect">
-            <a:avLst/>
-          </a:prstGeom>
-          <a:ln w="28575">
-            <a:solidFill>
-              <a:schemeClr val="tx1"/>
-            </a:solidFill>
-          </a:ln>
-        </p:spPr>
-        <p:txBody>
-          <a:bodyPr vert="horz" lIns="91440" tIns="45720" rIns="91440" bIns="45720" rtlCol="0" anchor="ctr">
-            <a:normAutofit/>
-          </a:bodyPr>
-          <a:lstStyle>
-            <a:lvl1pPr marL="228600" indent="-228600" algn="l" defTabSz="914400" rtl="0" eaLnBrk="1" latinLnBrk="0" hangingPunct="1">
-              <a:lnSpc>
-                <a:spcPct val="90000"/>
-              </a:lnSpc>
-              <a:spcBef>
-                <a:spcPts val="1000"/>
-              </a:spcBef>
-              <a:buFont typeface="Arial" panose="020B0604020202020204" pitchFamily="34" charset="0"/>
-              <a:buChar char="•"/>
-              <a:defRPr sz="2800" kern="1200">
-                <a:solidFill>
-                  <a:schemeClr val="tx1"/>
-                </a:solidFill>
-                <a:latin typeface="+mn-lt"/>
-                <a:ea typeface="+mn-ea"/>
-                <a:cs typeface="+mn-cs"/>
-              </a:defRPr>
-            </a:lvl1pPr>
-            <a:lvl2pPr marL="685800" indent="-228600" algn="l" defTabSz="914400" rtl="0" eaLnBrk="1" latinLnBrk="0" hangingPunct="1">
-              <a:lnSpc>
-                <a:spcPct val="90000"/>
-              </a:lnSpc>
-              <a:spcBef>
-                <a:spcPts val="500"/>
-              </a:spcBef>
-              <a:buFont typeface="Arial" panose="020B0604020202020204" pitchFamily="34" charset="0"/>
-              <a:buChar char="•"/>
-              <a:defRPr sz="2400" kern="1200">
-                <a:solidFill>
-                  <a:schemeClr val="tx1"/>
-                </a:solidFill>
-                <a:latin typeface="+mn-lt"/>
-                <a:ea typeface="+mn-ea"/>
-                <a:cs typeface="+mn-cs"/>
-              </a:defRPr>
-            </a:lvl2pPr>
-            <a:lvl3pPr marL="1143000" indent="-228600" algn="l" defTabSz="914400" rtl="0" eaLnBrk="1" latinLnBrk="0" hangingPunct="1">
-              <a:lnSpc>
-                <a:spcPct val="90000"/>
-              </a:lnSpc>
-              <a:spcBef>
-                <a:spcPts val="500"/>
-              </a:spcBef>
-              <a:buFont typeface="Arial" panose="020B0604020202020204" pitchFamily="34" charset="0"/>
-              <a:buChar char="•"/>
-              <a:defRPr sz="2000" kern="1200">
-                <a:solidFill>
-                  <a:schemeClr val="tx1"/>
-                </a:solidFill>
-                <a:latin typeface="+mn-lt"/>
-                <a:ea typeface="+mn-ea"/>
-                <a:cs typeface="+mn-cs"/>
-              </a:defRPr>
-            </a:lvl3pPr>
-            <a:lvl4pPr marL="1600200" indent="-228600" algn="l" defTabSz="914400" rtl="0" eaLnBrk="1" latinLnBrk="0" hangingPunct="1">
-              <a:lnSpc>
-                <a:spcPct val="90000"/>
-              </a:lnSpc>
-              <a:spcBef>
-                <a:spcPts val="500"/>
-              </a:spcBef>
-              <a:buFont typeface="Arial" panose="020B0604020202020204" pitchFamily="34" charset="0"/>
-              <a:buChar char="•"/>
-              <a:defRPr sz="1800" kern="1200">
-                <a:solidFill>
-                  <a:schemeClr val="tx1"/>
-                </a:solidFill>
-                <a:latin typeface="+mn-lt"/>
-                <a:ea typeface="+mn-ea"/>
-                <a:cs typeface="+mn-cs"/>
-              </a:defRPr>
-            </a:lvl4pPr>
-            <a:lvl5pPr marL="2057400" indent="-228600" algn="l" defTabSz="914400" rtl="0" eaLnBrk="1" latinLnBrk="0" hangingPunct="1">
-              <a:lnSpc>
-                <a:spcPct val="90000"/>
-              </a:lnSpc>
-              <a:spcBef>
-                <a:spcPts val="500"/>
-              </a:spcBef>
-              <a:buFont typeface="Arial" panose="020B0604020202020204" pitchFamily="34" charset="0"/>
-              <a:buChar char="•"/>
-              <a:defRPr sz="1800" kern="1200">
-                <a:solidFill>
-                  <a:schemeClr val="tx1"/>
-                </a:solidFill>
-                <a:latin typeface="+mn-lt"/>
-                <a:ea typeface="+mn-ea"/>
-                <a:cs typeface="+mn-cs"/>
-              </a:defRPr>
-            </a:lvl5pPr>
-            <a:lvl6pPr marL="2514600" indent="-228600" algn="l" defTabSz="914400" rtl="0" eaLnBrk="1" latinLnBrk="0" hangingPunct="1">
-              <a:lnSpc>
-                <a:spcPct val="90000"/>
-              </a:lnSpc>
-              <a:spcBef>
-                <a:spcPts val="500"/>
-              </a:spcBef>
-              <a:buFont typeface="Arial" panose="020B0604020202020204" pitchFamily="34" charset="0"/>
-              <a:buChar char="•"/>
-              <a:defRPr sz="1800" kern="1200">
-                <a:solidFill>
-                  <a:schemeClr val="tx1"/>
-                </a:solidFill>
-                <a:latin typeface="+mn-lt"/>
-                <a:ea typeface="+mn-ea"/>
-                <a:cs typeface="+mn-cs"/>
-              </a:defRPr>
-            </a:lvl6pPr>
-            <a:lvl7pPr marL="2971800" indent="-228600" algn="l" defTabSz="914400" rtl="0" eaLnBrk="1" latinLnBrk="0" hangingPunct="1">
-              <a:lnSpc>
-                <a:spcPct val="90000"/>
-              </a:lnSpc>
-              <a:spcBef>
-                <a:spcPts val="500"/>
-              </a:spcBef>
-              <a:buFont typeface="Arial" panose="020B0604020202020204" pitchFamily="34" charset="0"/>
-              <a:buChar char="•"/>
-              <a:defRPr sz="1800" kern="1200">
-                <a:solidFill>
-                  <a:schemeClr val="tx1"/>
-                </a:solidFill>
-                <a:latin typeface="+mn-lt"/>
-                <a:ea typeface="+mn-ea"/>
-                <a:cs typeface="+mn-cs"/>
-              </a:defRPr>
-            </a:lvl7pPr>
-            <a:lvl8pPr marL="3429000" indent="-228600" algn="l" defTabSz="914400" rtl="0" eaLnBrk="1" latinLnBrk="0" hangingPunct="1">
-              <a:lnSpc>
-                <a:spcPct val="90000"/>
-              </a:lnSpc>
-              <a:spcBef>
-                <a:spcPts val="500"/>
-              </a:spcBef>
-              <a:buFont typeface="Arial" panose="020B0604020202020204" pitchFamily="34" charset="0"/>
-              <a:buChar char="•"/>
-              <a:defRPr sz="1800" kern="1200">
-                <a:solidFill>
-                  <a:schemeClr val="tx1"/>
-                </a:solidFill>
-                <a:latin typeface="+mn-lt"/>
-                <a:ea typeface="+mn-ea"/>
-                <a:cs typeface="+mn-cs"/>
-              </a:defRPr>
-            </a:lvl8pPr>
-            <a:lvl9pPr marL="3886200" indent="-228600" algn="l" defTabSz="914400" rtl="0" eaLnBrk="1" latinLnBrk="0" hangingPunct="1">
-              <a:lnSpc>
-                <a:spcPct val="90000"/>
-              </a:lnSpc>
-              <a:spcBef>
-                <a:spcPts val="500"/>
-              </a:spcBef>
-              <a:buFont typeface="Arial" panose="020B0604020202020204" pitchFamily="34" charset="0"/>
-              <a:buChar char="•"/>
-              <a:defRPr sz="1800" kern="1200">
-                <a:solidFill>
-                  <a:schemeClr val="tx1"/>
-                </a:solidFill>
-                <a:latin typeface="+mn-lt"/>
-                <a:ea typeface="+mn-ea"/>
-                <a:cs typeface="+mn-cs"/>
-              </a:defRPr>
-            </a:lvl9pPr>
-          </a:lstStyle>
-          <a:p>
-            <a:r>
-              <a:rPr lang="it-IT" sz="2000" dirty="0">
-                <a:latin typeface="Bahnschrift SemiCondensed" panose="020B0502040204020203" pitchFamily="34" charset="0"/>
-              </a:rPr>
-              <a:t>TABLE OF RESULTS FOR COMPARISON</a:t>
-            </a:r>
-          </a:p>
-        </p:txBody>
-      </p:sp>
+          <p:cNvGraphicFramePr>
+            <a:graphicFrameLocks noGrp="1"/>
+          </p:cNvGraphicFramePr>
+          <p:nvPr>
+            <p:extLst>
+              <p:ext uri="{D42A27DB-BD31-4B8C-83A1-F6EECF244321}">
+                <p14:modId xmlns:p14="http://schemas.microsoft.com/office/powerpoint/2010/main" val="3111339501"/>
+              </p:ext>
+            </p:extLst>
+          </p:nvPr>
+        </p:nvGraphicFramePr>
+        <p:xfrm>
+          <a:off x="1713997" y="1516452"/>
+          <a:ext cx="8764005" cy="4204566"/>
+        </p:xfrm>
+        <a:graphic>
+          <a:graphicData uri="http://schemas.openxmlformats.org/drawingml/2006/table">
+            <a:tbl>
+              <a:tblPr firstRow="1" bandRow="1">
+                <a:tableStyleId>{5C22544A-7EE6-4342-B048-85BDC9FD1C3A}</a:tableStyleId>
+              </a:tblPr>
+              <a:tblGrid>
+                <a:gridCol w="2253476">
+                  <a:extLst>
+                    <a:ext uri="{9D8B030D-6E8A-4147-A177-3AD203B41FA5}">
+                      <a16:colId xmlns:a16="http://schemas.microsoft.com/office/drawing/2014/main" val="3190939759"/>
+                    </a:ext>
+                  </a:extLst>
+                </a:gridCol>
+                <a:gridCol w="3218688">
+                  <a:extLst>
+                    <a:ext uri="{9D8B030D-6E8A-4147-A177-3AD203B41FA5}">
+                      <a16:colId xmlns:a16="http://schemas.microsoft.com/office/drawing/2014/main" val="183368393"/>
+                    </a:ext>
+                  </a:extLst>
+                </a:gridCol>
+                <a:gridCol w="3291841">
+                  <a:extLst>
+                    <a:ext uri="{9D8B030D-6E8A-4147-A177-3AD203B41FA5}">
+                      <a16:colId xmlns:a16="http://schemas.microsoft.com/office/drawing/2014/main" val="1538463445"/>
+                    </a:ext>
+                  </a:extLst>
+                </a:gridCol>
+              </a:tblGrid>
+              <a:tr h="723342">
+                <a:tc>
+                  <a:txBody>
+                    <a:bodyPr/>
+                    <a:lstStyle/>
+                    <a:p>
+                      <a:pPr algn="ctr"/>
+                      <a:endParaRPr lang="en-GB" dirty="0"/>
+                    </a:p>
+                  </a:txBody>
+                  <a:tcPr anchor="ctr">
+                    <a:lnL w="12700" cap="flat" cmpd="sng" algn="ctr">
+                      <a:solidFill>
+                        <a:schemeClr val="tx1"/>
+                      </a:solidFill>
+                      <a:prstDash val="solid"/>
+                      <a:round/>
+                      <a:headEnd type="none" w="med" len="med"/>
+                      <a:tailEnd type="none" w="med" len="med"/>
+                    </a:lnL>
+                    <a:lnR w="12700" cap="flat" cmpd="sng" algn="ctr">
+                      <a:solidFill>
+                        <a:schemeClr val="tx1"/>
+                      </a:solidFill>
+                      <a:prstDash val="solid"/>
+                      <a:round/>
+                      <a:headEnd type="none" w="med" len="med"/>
+                      <a:tailEnd type="none" w="med" len="med"/>
+                    </a:lnR>
+                    <a:lnT w="12700" cap="flat" cmpd="sng" algn="ctr">
+                      <a:solidFill>
+                        <a:schemeClr val="tx1"/>
+                      </a:solidFill>
+                      <a:prstDash val="solid"/>
+                      <a:round/>
+                      <a:headEnd type="none" w="med" len="med"/>
+                      <a:tailEnd type="none" w="med" len="med"/>
+                    </a:lnT>
+                    <a:lnB w="12700" cap="flat" cmpd="sng" algn="ctr">
+                      <a:solidFill>
+                        <a:schemeClr val="tx1"/>
+                      </a:solidFill>
+                      <a:prstDash val="solid"/>
+                      <a:round/>
+                      <a:headEnd type="none" w="med" len="med"/>
+                      <a:tailEnd type="none" w="med" len="med"/>
+                    </a:lnB>
+                    <a:solidFill>
+                      <a:schemeClr val="bg1">
+                        <a:lumMod val="65000"/>
+                      </a:schemeClr>
+                    </a:solidFill>
+                  </a:tcPr>
+                </a:tc>
+                <a:tc>
+                  <a:txBody>
+                    <a:bodyPr/>
+                    <a:lstStyle/>
+                    <a:p>
+                      <a:pPr algn="ctr"/>
+                      <a:r>
+                        <a:rPr lang="en-GB" dirty="0"/>
+                        <a:t>PRO</a:t>
+                      </a:r>
+                    </a:p>
+                  </a:txBody>
+                  <a:tcPr anchor="ctr">
+                    <a:lnL w="12700" cap="flat" cmpd="sng" algn="ctr">
+                      <a:solidFill>
+                        <a:schemeClr val="tx1"/>
+                      </a:solidFill>
+                      <a:prstDash val="solid"/>
+                      <a:round/>
+                      <a:headEnd type="none" w="med" len="med"/>
+                      <a:tailEnd type="none" w="med" len="med"/>
+                    </a:lnL>
+                    <a:lnR w="12700" cap="flat" cmpd="sng" algn="ctr">
+                      <a:solidFill>
+                        <a:schemeClr val="tx1"/>
+                      </a:solidFill>
+                      <a:prstDash val="solid"/>
+                      <a:round/>
+                      <a:headEnd type="none" w="med" len="med"/>
+                      <a:tailEnd type="none" w="med" len="med"/>
+                    </a:lnR>
+                    <a:lnT w="12700" cap="flat" cmpd="sng" algn="ctr">
+                      <a:solidFill>
+                        <a:schemeClr val="tx1"/>
+                      </a:solidFill>
+                      <a:prstDash val="solid"/>
+                      <a:round/>
+                      <a:headEnd type="none" w="med" len="med"/>
+                      <a:tailEnd type="none" w="med" len="med"/>
+                    </a:lnT>
+                    <a:lnB w="12700" cap="flat" cmpd="sng" algn="ctr">
+                      <a:solidFill>
+                        <a:schemeClr val="tx1"/>
+                      </a:solidFill>
+                      <a:prstDash val="solid"/>
+                      <a:round/>
+                      <a:headEnd type="none" w="med" len="med"/>
+                      <a:tailEnd type="none" w="med" len="med"/>
+                    </a:lnB>
+                    <a:solidFill>
+                      <a:schemeClr val="bg1">
+                        <a:lumMod val="65000"/>
+                      </a:schemeClr>
+                    </a:solidFill>
+                  </a:tcPr>
+                </a:tc>
+                <a:tc>
+                  <a:txBody>
+                    <a:bodyPr/>
+                    <a:lstStyle/>
+                    <a:p>
+                      <a:pPr algn="ctr"/>
+                      <a:r>
+                        <a:rPr lang="en-GB" dirty="0"/>
+                        <a:t>CONS</a:t>
+                      </a:r>
+                    </a:p>
+                  </a:txBody>
+                  <a:tcPr anchor="ctr">
+                    <a:lnL w="12700" cap="flat" cmpd="sng" algn="ctr">
+                      <a:solidFill>
+                        <a:schemeClr val="tx1"/>
+                      </a:solidFill>
+                      <a:prstDash val="solid"/>
+                      <a:round/>
+                      <a:headEnd type="none" w="med" len="med"/>
+                      <a:tailEnd type="none" w="med" len="med"/>
+                    </a:lnL>
+                    <a:lnR w="12700" cap="flat" cmpd="sng" algn="ctr">
+                      <a:solidFill>
+                        <a:schemeClr val="tx1"/>
+                      </a:solidFill>
+                      <a:prstDash val="solid"/>
+                      <a:round/>
+                      <a:headEnd type="none" w="med" len="med"/>
+                      <a:tailEnd type="none" w="med" len="med"/>
+                    </a:lnR>
+                    <a:lnT w="12700" cap="flat" cmpd="sng" algn="ctr">
+                      <a:solidFill>
+                        <a:schemeClr val="tx1"/>
+                      </a:solidFill>
+                      <a:prstDash val="solid"/>
+                      <a:round/>
+                      <a:headEnd type="none" w="med" len="med"/>
+                      <a:tailEnd type="none" w="med" len="med"/>
+                    </a:lnT>
+                    <a:lnB w="12700" cap="flat" cmpd="sng" algn="ctr">
+                      <a:solidFill>
+                        <a:schemeClr val="tx1"/>
+                      </a:solidFill>
+                      <a:prstDash val="solid"/>
+                      <a:round/>
+                      <a:headEnd type="none" w="med" len="med"/>
+                      <a:tailEnd type="none" w="med" len="med"/>
+                    </a:lnB>
+                    <a:solidFill>
+                      <a:schemeClr val="bg1">
+                        <a:lumMod val="65000"/>
+                      </a:schemeClr>
+                    </a:solidFill>
+                  </a:tcPr>
+                </a:tc>
+                <a:extLst>
+                  <a:ext uri="{0D108BD9-81ED-4DB2-BD59-A6C34878D82A}">
+                    <a16:rowId xmlns:a16="http://schemas.microsoft.com/office/drawing/2014/main" val="2929756499"/>
+                  </a:ext>
+                </a:extLst>
+              </a:tr>
+              <a:tr h="845448">
+                <a:tc>
+                  <a:txBody>
+                    <a:bodyPr/>
+                    <a:lstStyle/>
+                    <a:p>
+                      <a:pPr algn="ctr"/>
+                      <a:r>
+                        <a:rPr lang="en-GB" dirty="0"/>
+                        <a:t>LINEAR</a:t>
+                      </a:r>
+                    </a:p>
+                  </a:txBody>
+                  <a:tcPr anchor="ctr">
+                    <a:lnL w="12700" cap="flat" cmpd="sng" algn="ctr">
+                      <a:solidFill>
+                        <a:schemeClr val="tx1"/>
+                      </a:solidFill>
+                      <a:prstDash val="solid"/>
+                      <a:round/>
+                      <a:headEnd type="none" w="med" len="med"/>
+                      <a:tailEnd type="none" w="med" len="med"/>
+                    </a:lnL>
+                    <a:lnR w="12700" cap="flat" cmpd="sng" algn="ctr">
+                      <a:solidFill>
+                        <a:schemeClr val="tx1"/>
+                      </a:solidFill>
+                      <a:prstDash val="solid"/>
+                      <a:round/>
+                      <a:headEnd type="none" w="med" len="med"/>
+                      <a:tailEnd type="none" w="med" len="med"/>
+                    </a:lnR>
+                    <a:lnT w="12700" cap="flat" cmpd="sng" algn="ctr">
+                      <a:solidFill>
+                        <a:schemeClr val="tx1"/>
+                      </a:solidFill>
+                      <a:prstDash val="solid"/>
+                      <a:round/>
+                      <a:headEnd type="none" w="med" len="med"/>
+                      <a:tailEnd type="none" w="med" len="med"/>
+                    </a:lnT>
+                    <a:lnB w="12700" cap="flat" cmpd="sng" algn="ctr">
+                      <a:solidFill>
+                        <a:schemeClr val="tx1"/>
+                      </a:solidFill>
+                      <a:prstDash val="solid"/>
+                      <a:round/>
+                      <a:headEnd type="none" w="med" len="med"/>
+                      <a:tailEnd type="none" w="med" len="med"/>
+                    </a:lnB>
+                    <a:solidFill>
+                      <a:schemeClr val="bg1">
+                        <a:lumMod val="75000"/>
+                      </a:schemeClr>
+                    </a:solidFill>
+                  </a:tcPr>
+                </a:tc>
+                <a:tc>
+                  <a:txBody>
+                    <a:bodyPr/>
+                    <a:lstStyle/>
+                    <a:p>
+                      <a:pPr algn="ctr"/>
+                      <a:r>
+                        <a:rPr lang="en-GB" dirty="0"/>
+                        <a:t>Linear dynamics</a:t>
+                      </a:r>
+                    </a:p>
+                    <a:p>
+                      <a:pPr algn="ctr"/>
+                      <a:r>
+                        <a:rPr lang="en-GB" dirty="0"/>
+                        <a:t>Poles allocation rule</a:t>
+                      </a:r>
+                    </a:p>
+                  </a:txBody>
+                  <a:tcPr anchor="ctr">
+                    <a:lnL w="12700" cap="flat" cmpd="sng" algn="ctr">
+                      <a:solidFill>
+                        <a:schemeClr val="tx1"/>
+                      </a:solidFill>
+                      <a:prstDash val="solid"/>
+                      <a:round/>
+                      <a:headEnd type="none" w="med" len="med"/>
+                      <a:tailEnd type="none" w="med" len="med"/>
+                    </a:lnL>
+                    <a:lnR w="12700" cap="flat" cmpd="sng" algn="ctr">
+                      <a:solidFill>
+                        <a:schemeClr val="tx1"/>
+                      </a:solidFill>
+                      <a:prstDash val="solid"/>
+                      <a:round/>
+                      <a:headEnd type="none" w="med" len="med"/>
+                      <a:tailEnd type="none" w="med" len="med"/>
+                    </a:lnR>
+                    <a:lnT w="12700" cap="flat" cmpd="sng" algn="ctr">
+                      <a:solidFill>
+                        <a:schemeClr val="tx1"/>
+                      </a:solidFill>
+                      <a:prstDash val="solid"/>
+                      <a:round/>
+                      <a:headEnd type="none" w="med" len="med"/>
+                      <a:tailEnd type="none" w="med" len="med"/>
+                    </a:lnT>
+                    <a:lnB w="12700" cap="flat" cmpd="sng" algn="ctr">
+                      <a:solidFill>
+                        <a:schemeClr val="tx1"/>
+                      </a:solidFill>
+                      <a:prstDash val="solid"/>
+                      <a:round/>
+                      <a:headEnd type="none" w="med" len="med"/>
+                      <a:tailEnd type="none" w="med" len="med"/>
+                    </a:lnB>
+                    <a:solidFill>
+                      <a:schemeClr val="accent6">
+                        <a:lumMod val="40000"/>
+                        <a:lumOff val="60000"/>
+                      </a:schemeClr>
+                    </a:solidFill>
+                  </a:tcPr>
+                </a:tc>
+                <a:tc>
+                  <a:txBody>
+                    <a:bodyPr/>
+                    <a:lstStyle/>
+                    <a:p>
+                      <a:pPr algn="ctr"/>
+                      <a:r>
+                        <a:rPr lang="en-GB" sz="1400" dirty="0"/>
+                        <a:t>Sensitivity</a:t>
+                      </a:r>
+                    </a:p>
+                    <a:p>
+                      <a:pPr algn="ctr"/>
+                      <a:r>
+                        <a:rPr lang="en-GB" sz="1400" dirty="0"/>
+                        <a:t>Approximation around equilibrium</a:t>
+                      </a:r>
+                    </a:p>
+                    <a:p>
+                      <a:pPr algn="ctr"/>
+                      <a:r>
+                        <a:rPr lang="en-GB" sz="1400" dirty="0"/>
+                        <a:t>Differential Flatness needed</a:t>
+                      </a:r>
+                    </a:p>
+                    <a:p>
+                      <a:pPr algn="ctr"/>
+                      <a:r>
+                        <a:rPr lang="en-GB" sz="1400" dirty="0"/>
+                        <a:t>Stability only for specific conditions</a:t>
+                      </a:r>
+                    </a:p>
+                  </a:txBody>
+                  <a:tcPr anchor="ctr">
+                    <a:lnL w="12700" cap="flat" cmpd="sng" algn="ctr">
+                      <a:solidFill>
+                        <a:schemeClr val="tx1"/>
+                      </a:solidFill>
+                      <a:prstDash val="solid"/>
+                      <a:round/>
+                      <a:headEnd type="none" w="med" len="med"/>
+                      <a:tailEnd type="none" w="med" len="med"/>
+                    </a:lnL>
+                    <a:lnR w="12700" cap="flat" cmpd="sng" algn="ctr">
+                      <a:solidFill>
+                        <a:schemeClr val="tx1"/>
+                      </a:solidFill>
+                      <a:prstDash val="solid"/>
+                      <a:round/>
+                      <a:headEnd type="none" w="med" len="med"/>
+                      <a:tailEnd type="none" w="med" len="med"/>
+                    </a:lnR>
+                    <a:lnT w="12700" cap="flat" cmpd="sng" algn="ctr">
+                      <a:solidFill>
+                        <a:schemeClr val="tx1"/>
+                      </a:solidFill>
+                      <a:prstDash val="solid"/>
+                      <a:round/>
+                      <a:headEnd type="none" w="med" len="med"/>
+                      <a:tailEnd type="none" w="med" len="med"/>
+                    </a:lnT>
+                    <a:lnB w="12700" cap="flat" cmpd="sng" algn="ctr">
+                      <a:solidFill>
+                        <a:schemeClr val="tx1"/>
+                      </a:solidFill>
+                      <a:prstDash val="solid"/>
+                      <a:round/>
+                      <a:headEnd type="none" w="med" len="med"/>
+                      <a:tailEnd type="none" w="med" len="med"/>
+                    </a:lnB>
+                    <a:solidFill>
+                      <a:srgbClr val="F1C7C8"/>
+                    </a:solidFill>
+                  </a:tcPr>
+                </a:tc>
+                <a:extLst>
+                  <a:ext uri="{0D108BD9-81ED-4DB2-BD59-A6C34878D82A}">
+                    <a16:rowId xmlns:a16="http://schemas.microsoft.com/office/drawing/2014/main" val="2313229196"/>
+                  </a:ext>
+                </a:extLst>
+              </a:tr>
+              <a:tr h="845448">
+                <a:tc>
+                  <a:txBody>
+                    <a:bodyPr/>
+                    <a:lstStyle/>
+                    <a:p>
+                      <a:pPr algn="ctr"/>
+                      <a:r>
+                        <a:rPr lang="en-GB" dirty="0"/>
+                        <a:t>NON-LINEAR</a:t>
+                      </a:r>
+                    </a:p>
+                  </a:txBody>
+                  <a:tcPr anchor="ctr">
+                    <a:lnL w="12700" cap="flat" cmpd="sng" algn="ctr">
+                      <a:solidFill>
+                        <a:schemeClr val="tx1"/>
+                      </a:solidFill>
+                      <a:prstDash val="solid"/>
+                      <a:round/>
+                      <a:headEnd type="none" w="med" len="med"/>
+                      <a:tailEnd type="none" w="med" len="med"/>
+                    </a:lnL>
+                    <a:lnR w="12700" cap="flat" cmpd="sng" algn="ctr">
+                      <a:solidFill>
+                        <a:schemeClr val="tx1"/>
+                      </a:solidFill>
+                      <a:prstDash val="solid"/>
+                      <a:round/>
+                      <a:headEnd type="none" w="med" len="med"/>
+                      <a:tailEnd type="none" w="med" len="med"/>
+                    </a:lnR>
+                    <a:lnT w="12700" cap="flat" cmpd="sng" algn="ctr">
+                      <a:solidFill>
+                        <a:schemeClr val="tx1"/>
+                      </a:solidFill>
+                      <a:prstDash val="solid"/>
+                      <a:round/>
+                      <a:headEnd type="none" w="med" len="med"/>
+                      <a:tailEnd type="none" w="med" len="med"/>
+                    </a:lnT>
+                    <a:lnB w="12700" cap="flat" cmpd="sng" algn="ctr">
+                      <a:solidFill>
+                        <a:schemeClr val="tx1"/>
+                      </a:solidFill>
+                      <a:prstDash val="solid"/>
+                      <a:round/>
+                      <a:headEnd type="none" w="med" len="med"/>
+                      <a:tailEnd type="none" w="med" len="med"/>
+                    </a:lnB>
+                    <a:solidFill>
+                      <a:schemeClr val="bg1">
+                        <a:lumMod val="75000"/>
+                      </a:schemeClr>
+                    </a:solidFill>
+                  </a:tcPr>
+                </a:tc>
+                <a:tc>
+                  <a:txBody>
+                    <a:bodyPr/>
+                    <a:lstStyle/>
+                    <a:p>
+                      <a:pPr algn="ctr"/>
+                      <a:r>
+                        <a:rPr lang="en-GB" dirty="0"/>
+                        <a:t>No approximation needed</a:t>
+                      </a:r>
+                    </a:p>
+                  </a:txBody>
+                  <a:tcPr anchor="ctr">
+                    <a:lnL w="12700" cap="flat" cmpd="sng" algn="ctr">
+                      <a:solidFill>
+                        <a:schemeClr val="tx1"/>
+                      </a:solidFill>
+                      <a:prstDash val="solid"/>
+                      <a:round/>
+                      <a:headEnd type="none" w="med" len="med"/>
+                      <a:tailEnd type="none" w="med" len="med"/>
+                    </a:lnL>
+                    <a:lnR w="12700" cap="flat" cmpd="sng" algn="ctr">
+                      <a:solidFill>
+                        <a:schemeClr val="tx1"/>
+                      </a:solidFill>
+                      <a:prstDash val="solid"/>
+                      <a:round/>
+                      <a:headEnd type="none" w="med" len="med"/>
+                      <a:tailEnd type="none" w="med" len="med"/>
+                    </a:lnR>
+                    <a:lnT w="12700" cap="flat" cmpd="sng" algn="ctr">
+                      <a:solidFill>
+                        <a:schemeClr val="tx1"/>
+                      </a:solidFill>
+                      <a:prstDash val="solid"/>
+                      <a:round/>
+                      <a:headEnd type="none" w="med" len="med"/>
+                      <a:tailEnd type="none" w="med" len="med"/>
+                    </a:lnT>
+                    <a:lnB w="12700" cap="flat" cmpd="sng" algn="ctr">
+                      <a:solidFill>
+                        <a:schemeClr val="tx1"/>
+                      </a:solidFill>
+                      <a:prstDash val="solid"/>
+                      <a:round/>
+                      <a:headEnd type="none" w="med" len="med"/>
+                      <a:tailEnd type="none" w="med" len="med"/>
+                    </a:lnB>
+                    <a:solidFill>
+                      <a:schemeClr val="accent6">
+                        <a:lumMod val="40000"/>
+                        <a:lumOff val="60000"/>
+                      </a:schemeClr>
+                    </a:solidFill>
+                  </a:tcPr>
+                </a:tc>
+                <a:tc>
+                  <a:txBody>
+                    <a:bodyPr/>
+                    <a:lstStyle/>
+                    <a:p>
+                      <a:pPr algn="ctr"/>
+                      <a:r>
+                        <a:rPr lang="en-GB" sz="1400" dirty="0"/>
+                        <a:t>Non-linear dynamics</a:t>
+                      </a:r>
+                    </a:p>
+                    <a:p>
+                      <a:pPr marL="0" marR="0" lvl="0" indent="0" algn="ctr" defTabSz="914400" rtl="0" eaLnBrk="1" fontAlgn="auto" latinLnBrk="0" hangingPunct="1">
+                        <a:lnSpc>
+                          <a:spcPct val="100000"/>
+                        </a:lnSpc>
+                        <a:spcBef>
+                          <a:spcPts val="0"/>
+                        </a:spcBef>
+                        <a:spcAft>
+                          <a:spcPts val="0"/>
+                        </a:spcAft>
+                        <a:buClrTx/>
+                        <a:buSzTx/>
+                        <a:buFontTx/>
+                        <a:buNone/>
+                        <a:tabLst/>
+                        <a:defRPr/>
+                      </a:pPr>
+                      <a:r>
+                        <a:rPr lang="en-GB" sz="1400" dirty="0"/>
+                        <a:t>Differential Flatness needed</a:t>
+                      </a:r>
+                    </a:p>
+                  </a:txBody>
+                  <a:tcPr anchor="ctr">
+                    <a:lnL w="12700" cap="flat" cmpd="sng" algn="ctr">
+                      <a:solidFill>
+                        <a:schemeClr val="tx1"/>
+                      </a:solidFill>
+                      <a:prstDash val="solid"/>
+                      <a:round/>
+                      <a:headEnd type="none" w="med" len="med"/>
+                      <a:tailEnd type="none" w="med" len="med"/>
+                    </a:lnL>
+                    <a:lnR w="12700" cap="flat" cmpd="sng" algn="ctr">
+                      <a:solidFill>
+                        <a:schemeClr val="tx1"/>
+                      </a:solidFill>
+                      <a:prstDash val="solid"/>
+                      <a:round/>
+                      <a:headEnd type="none" w="med" len="med"/>
+                      <a:tailEnd type="none" w="med" len="med"/>
+                    </a:lnR>
+                    <a:lnT w="12700" cap="flat" cmpd="sng" algn="ctr">
+                      <a:solidFill>
+                        <a:schemeClr val="tx1"/>
+                      </a:solidFill>
+                      <a:prstDash val="solid"/>
+                      <a:round/>
+                      <a:headEnd type="none" w="med" len="med"/>
+                      <a:tailEnd type="none" w="med" len="med"/>
+                    </a:lnT>
+                    <a:lnB w="12700" cap="flat" cmpd="sng" algn="ctr">
+                      <a:solidFill>
+                        <a:schemeClr val="tx1"/>
+                      </a:solidFill>
+                      <a:prstDash val="solid"/>
+                      <a:round/>
+                      <a:headEnd type="none" w="med" len="med"/>
+                      <a:tailEnd type="none" w="med" len="med"/>
+                    </a:lnB>
+                    <a:solidFill>
+                      <a:srgbClr val="F1C7C8"/>
+                    </a:solidFill>
+                  </a:tcPr>
+                </a:tc>
+                <a:extLst>
+                  <a:ext uri="{0D108BD9-81ED-4DB2-BD59-A6C34878D82A}">
+                    <a16:rowId xmlns:a16="http://schemas.microsoft.com/office/drawing/2014/main" val="2685718488"/>
+                  </a:ext>
+                </a:extLst>
+              </a:tr>
+              <a:tr h="845448">
+                <a:tc>
+                  <a:txBody>
+                    <a:bodyPr/>
+                    <a:lstStyle/>
+                    <a:p>
+                      <a:pPr algn="ctr"/>
+                      <a:r>
+                        <a:rPr lang="en-GB" dirty="0"/>
+                        <a:t>SAGITTAL</a:t>
+                      </a:r>
+                    </a:p>
+                  </a:txBody>
+                  <a:tcPr anchor="ctr">
+                    <a:lnL w="12700" cap="flat" cmpd="sng" algn="ctr">
+                      <a:solidFill>
+                        <a:schemeClr val="tx1"/>
+                      </a:solidFill>
+                      <a:prstDash val="solid"/>
+                      <a:round/>
+                      <a:headEnd type="none" w="med" len="med"/>
+                      <a:tailEnd type="none" w="med" len="med"/>
+                    </a:lnL>
+                    <a:lnR w="12700" cap="flat" cmpd="sng" algn="ctr">
+                      <a:solidFill>
+                        <a:schemeClr val="tx1"/>
+                      </a:solidFill>
+                      <a:prstDash val="solid"/>
+                      <a:round/>
+                      <a:headEnd type="none" w="med" len="med"/>
+                      <a:tailEnd type="none" w="med" len="med"/>
+                    </a:lnR>
+                    <a:lnT w="12700" cap="flat" cmpd="sng" algn="ctr">
+                      <a:solidFill>
+                        <a:schemeClr val="tx1"/>
+                      </a:solidFill>
+                      <a:prstDash val="solid"/>
+                      <a:round/>
+                      <a:headEnd type="none" w="med" len="med"/>
+                      <a:tailEnd type="none" w="med" len="med"/>
+                    </a:lnT>
+                    <a:lnB w="12700" cap="flat" cmpd="sng" algn="ctr">
+                      <a:solidFill>
+                        <a:schemeClr val="tx1"/>
+                      </a:solidFill>
+                      <a:prstDash val="solid"/>
+                      <a:round/>
+                      <a:headEnd type="none" w="med" len="med"/>
+                      <a:tailEnd type="none" w="med" len="med"/>
+                    </a:lnB>
+                    <a:solidFill>
+                      <a:schemeClr val="bg1">
+                        <a:lumMod val="75000"/>
+                      </a:schemeClr>
+                    </a:solidFill>
+                  </a:tcPr>
+                </a:tc>
+                <a:tc>
+                  <a:txBody>
+                    <a:bodyPr/>
+                    <a:lstStyle/>
+                    <a:p>
+                      <a:pPr algn="ctr"/>
+                      <a:r>
+                        <a:rPr lang="en-GB" dirty="0"/>
+                        <a:t>Decoupled dynamics</a:t>
+                      </a:r>
+                    </a:p>
+                    <a:p>
+                      <a:pPr algn="ctr"/>
+                      <a:r>
+                        <a:rPr lang="en-GB" dirty="0"/>
+                        <a:t>No differential flatness</a:t>
+                      </a:r>
+                    </a:p>
+                  </a:txBody>
+                  <a:tcPr anchor="ctr">
+                    <a:lnL w="12700" cap="flat" cmpd="sng" algn="ctr">
+                      <a:solidFill>
+                        <a:schemeClr val="tx1"/>
+                      </a:solidFill>
+                      <a:prstDash val="solid"/>
+                      <a:round/>
+                      <a:headEnd type="none" w="med" len="med"/>
+                      <a:tailEnd type="none" w="med" len="med"/>
+                    </a:lnL>
+                    <a:lnR w="12700" cap="flat" cmpd="sng" algn="ctr">
+                      <a:solidFill>
+                        <a:schemeClr val="tx1"/>
+                      </a:solidFill>
+                      <a:prstDash val="solid"/>
+                      <a:round/>
+                      <a:headEnd type="none" w="med" len="med"/>
+                      <a:tailEnd type="none" w="med" len="med"/>
+                    </a:lnR>
+                    <a:lnT w="12700" cap="flat" cmpd="sng" algn="ctr">
+                      <a:solidFill>
+                        <a:schemeClr val="tx1"/>
+                      </a:solidFill>
+                      <a:prstDash val="solid"/>
+                      <a:round/>
+                      <a:headEnd type="none" w="med" len="med"/>
+                      <a:tailEnd type="none" w="med" len="med"/>
+                    </a:lnT>
+                    <a:lnB w="12700" cap="flat" cmpd="sng" algn="ctr">
+                      <a:solidFill>
+                        <a:schemeClr val="tx1"/>
+                      </a:solidFill>
+                      <a:prstDash val="solid"/>
+                      <a:round/>
+                      <a:headEnd type="none" w="med" len="med"/>
+                      <a:tailEnd type="none" w="med" len="med"/>
+                    </a:lnB>
+                    <a:solidFill>
+                      <a:schemeClr val="accent6">
+                        <a:lumMod val="40000"/>
+                        <a:lumOff val="60000"/>
+                      </a:schemeClr>
+                    </a:solidFill>
+                  </a:tcPr>
+                </a:tc>
+                <a:tc>
+                  <a:txBody>
+                    <a:bodyPr/>
+                    <a:lstStyle/>
+                    <a:p>
+                      <a:pPr algn="ctr"/>
+                      <a:r>
+                        <a:rPr lang="en-GB" sz="1400" dirty="0"/>
+                        <a:t>Smooth desired trajectory</a:t>
+                      </a:r>
+                    </a:p>
+                    <a:p>
+                      <a:pPr algn="ctr"/>
+                      <a:r>
+                        <a:rPr lang="en-GB" sz="1400" dirty="0"/>
+                        <a:t>Theta is not controllable</a:t>
+                      </a:r>
+                    </a:p>
+                    <a:p>
+                      <a:pPr algn="ctr"/>
+                      <a:r>
+                        <a:rPr lang="en-GB" sz="1400" dirty="0"/>
+                        <a:t>Constraint on b</a:t>
+                      </a:r>
+                    </a:p>
+                  </a:txBody>
+                  <a:tcPr anchor="ctr">
+                    <a:lnL w="12700" cap="flat" cmpd="sng" algn="ctr">
+                      <a:solidFill>
+                        <a:schemeClr val="tx1"/>
+                      </a:solidFill>
+                      <a:prstDash val="solid"/>
+                      <a:round/>
+                      <a:headEnd type="none" w="med" len="med"/>
+                      <a:tailEnd type="none" w="med" len="med"/>
+                    </a:lnL>
+                    <a:lnR w="12700" cap="flat" cmpd="sng" algn="ctr">
+                      <a:solidFill>
+                        <a:schemeClr val="tx1"/>
+                      </a:solidFill>
+                      <a:prstDash val="solid"/>
+                      <a:round/>
+                      <a:headEnd type="none" w="med" len="med"/>
+                      <a:tailEnd type="none" w="med" len="med"/>
+                    </a:lnR>
+                    <a:lnT w="12700" cap="flat" cmpd="sng" algn="ctr">
+                      <a:solidFill>
+                        <a:schemeClr val="tx1"/>
+                      </a:solidFill>
+                      <a:prstDash val="solid"/>
+                      <a:round/>
+                      <a:headEnd type="none" w="med" len="med"/>
+                      <a:tailEnd type="none" w="med" len="med"/>
+                    </a:lnT>
+                    <a:lnB w="12700" cap="flat" cmpd="sng" algn="ctr">
+                      <a:solidFill>
+                        <a:schemeClr val="tx1"/>
+                      </a:solidFill>
+                      <a:prstDash val="solid"/>
+                      <a:round/>
+                      <a:headEnd type="none" w="med" len="med"/>
+                      <a:tailEnd type="none" w="med" len="med"/>
+                    </a:lnB>
+                    <a:solidFill>
+                      <a:srgbClr val="F1C7C8"/>
+                    </a:solidFill>
+                  </a:tcPr>
+                </a:tc>
+                <a:extLst>
+                  <a:ext uri="{0D108BD9-81ED-4DB2-BD59-A6C34878D82A}">
+                    <a16:rowId xmlns:a16="http://schemas.microsoft.com/office/drawing/2014/main" val="2856893584"/>
+                  </a:ext>
+                </a:extLst>
+              </a:tr>
+              <a:tr h="845448">
+                <a:tc>
+                  <a:txBody>
+                    <a:bodyPr/>
+                    <a:lstStyle/>
+                    <a:p>
+                      <a:pPr algn="ctr"/>
+                      <a:r>
+                        <a:rPr lang="en-GB" dirty="0"/>
+                        <a:t>DOUBLE DERIVATIVES</a:t>
+                      </a:r>
+                    </a:p>
+                  </a:txBody>
+                  <a:tcPr anchor="ctr">
+                    <a:lnL w="12700" cap="flat" cmpd="sng" algn="ctr">
+                      <a:solidFill>
+                        <a:schemeClr val="tx1"/>
+                      </a:solidFill>
+                      <a:prstDash val="solid"/>
+                      <a:round/>
+                      <a:headEnd type="none" w="med" len="med"/>
+                      <a:tailEnd type="none" w="med" len="med"/>
+                    </a:lnL>
+                    <a:lnR w="12700" cap="flat" cmpd="sng" algn="ctr">
+                      <a:solidFill>
+                        <a:schemeClr val="tx1"/>
+                      </a:solidFill>
+                      <a:prstDash val="solid"/>
+                      <a:round/>
+                      <a:headEnd type="none" w="med" len="med"/>
+                      <a:tailEnd type="none" w="med" len="med"/>
+                    </a:lnR>
+                    <a:lnT w="12700" cap="flat" cmpd="sng" algn="ctr">
+                      <a:solidFill>
+                        <a:schemeClr val="tx1"/>
+                      </a:solidFill>
+                      <a:prstDash val="solid"/>
+                      <a:round/>
+                      <a:headEnd type="none" w="med" len="med"/>
+                      <a:tailEnd type="none" w="med" len="med"/>
+                    </a:lnT>
+                    <a:lnB w="12700" cap="flat" cmpd="sng" algn="ctr">
+                      <a:solidFill>
+                        <a:schemeClr val="tx1"/>
+                      </a:solidFill>
+                      <a:prstDash val="solid"/>
+                      <a:round/>
+                      <a:headEnd type="none" w="med" len="med"/>
+                      <a:tailEnd type="none" w="med" len="med"/>
+                    </a:lnB>
+                    <a:solidFill>
+                      <a:schemeClr val="bg1">
+                        <a:lumMod val="75000"/>
+                      </a:schemeClr>
+                    </a:solidFill>
+                  </a:tcPr>
+                </a:tc>
+                <a:tc>
+                  <a:txBody>
+                    <a:bodyPr/>
+                    <a:lstStyle/>
+                    <a:p>
+                      <a:pPr marL="0" marR="0" lvl="0" indent="0" algn="ctr" defTabSz="914400" rtl="0" eaLnBrk="1" fontAlgn="auto" latinLnBrk="0" hangingPunct="1">
+                        <a:lnSpc>
+                          <a:spcPct val="100000"/>
+                        </a:lnSpc>
+                        <a:spcBef>
+                          <a:spcPts val="0"/>
+                        </a:spcBef>
+                        <a:spcAft>
+                          <a:spcPts val="0"/>
+                        </a:spcAft>
+                        <a:buClrTx/>
+                        <a:buSzTx/>
+                        <a:buFontTx/>
+                        <a:buNone/>
+                        <a:tabLst/>
+                        <a:defRPr/>
+                      </a:pPr>
+                      <a:r>
+                        <a:rPr lang="en-GB" dirty="0"/>
+                        <a:t>Decoupled dynamics</a:t>
+                      </a:r>
+                    </a:p>
+                    <a:p>
+                      <a:pPr marL="0" marR="0" lvl="0" indent="0" algn="ctr" defTabSz="914400" rtl="0" eaLnBrk="1" fontAlgn="auto" latinLnBrk="0" hangingPunct="1">
+                        <a:lnSpc>
+                          <a:spcPct val="100000"/>
+                        </a:lnSpc>
+                        <a:spcBef>
+                          <a:spcPts val="0"/>
+                        </a:spcBef>
+                        <a:spcAft>
+                          <a:spcPts val="0"/>
+                        </a:spcAft>
+                        <a:buClrTx/>
+                        <a:buSzTx/>
+                        <a:buFontTx/>
+                        <a:buNone/>
+                        <a:tabLst/>
+                        <a:defRPr/>
+                      </a:pPr>
+                      <a:r>
+                        <a:rPr lang="en-GB" dirty="0"/>
+                        <a:t>No differential flatness</a:t>
+                      </a:r>
+                    </a:p>
+                  </a:txBody>
+                  <a:tcPr anchor="ctr">
+                    <a:lnL w="12700" cap="flat" cmpd="sng" algn="ctr">
+                      <a:solidFill>
+                        <a:schemeClr val="tx1"/>
+                      </a:solidFill>
+                      <a:prstDash val="solid"/>
+                      <a:round/>
+                      <a:headEnd type="none" w="med" len="med"/>
+                      <a:tailEnd type="none" w="med" len="med"/>
+                    </a:lnL>
+                    <a:lnR w="12700" cap="flat" cmpd="sng" algn="ctr">
+                      <a:solidFill>
+                        <a:schemeClr val="tx1"/>
+                      </a:solidFill>
+                      <a:prstDash val="solid"/>
+                      <a:round/>
+                      <a:headEnd type="none" w="med" len="med"/>
+                      <a:tailEnd type="none" w="med" len="med"/>
+                    </a:lnR>
+                    <a:lnT w="12700" cap="flat" cmpd="sng" algn="ctr">
+                      <a:solidFill>
+                        <a:schemeClr val="tx1"/>
+                      </a:solidFill>
+                      <a:prstDash val="solid"/>
+                      <a:round/>
+                      <a:headEnd type="none" w="med" len="med"/>
+                      <a:tailEnd type="none" w="med" len="med"/>
+                    </a:lnT>
+                    <a:lnB w="12700" cap="flat" cmpd="sng" algn="ctr">
+                      <a:solidFill>
+                        <a:schemeClr val="tx1"/>
+                      </a:solidFill>
+                      <a:prstDash val="solid"/>
+                      <a:round/>
+                      <a:headEnd type="none" w="med" len="med"/>
+                      <a:tailEnd type="none" w="med" len="med"/>
+                    </a:lnB>
+                    <a:solidFill>
+                      <a:schemeClr val="accent6">
+                        <a:lumMod val="40000"/>
+                        <a:lumOff val="60000"/>
+                      </a:schemeClr>
+                    </a:solidFill>
+                  </a:tcPr>
+                </a:tc>
+                <a:tc>
+                  <a:txBody>
+                    <a:bodyPr/>
+                    <a:lstStyle/>
+                    <a:p>
+                      <a:pPr algn="ctr"/>
+                      <a:r>
+                        <a:rPr lang="en-GB" sz="1400" dirty="0"/>
+                        <a:t>Relies on second order derivatives</a:t>
+                      </a:r>
+                    </a:p>
+                    <a:p>
+                      <a:pPr algn="ctr"/>
+                      <a:r>
+                        <a:rPr lang="en-GB" sz="1400" dirty="0"/>
+                        <a:t>Constraint on linear velocity v</a:t>
+                      </a:r>
+                    </a:p>
+                  </a:txBody>
+                  <a:tcPr anchor="ctr">
+                    <a:lnL w="12700" cap="flat" cmpd="sng" algn="ctr">
+                      <a:solidFill>
+                        <a:schemeClr val="tx1"/>
+                      </a:solidFill>
+                      <a:prstDash val="solid"/>
+                      <a:round/>
+                      <a:headEnd type="none" w="med" len="med"/>
+                      <a:tailEnd type="none" w="med" len="med"/>
+                    </a:lnL>
+                    <a:lnR w="12700" cap="flat" cmpd="sng" algn="ctr">
+                      <a:solidFill>
+                        <a:schemeClr val="tx1"/>
+                      </a:solidFill>
+                      <a:prstDash val="solid"/>
+                      <a:round/>
+                      <a:headEnd type="none" w="med" len="med"/>
+                      <a:tailEnd type="none" w="med" len="med"/>
+                    </a:lnR>
+                    <a:lnT w="12700" cap="flat" cmpd="sng" algn="ctr">
+                      <a:solidFill>
+                        <a:schemeClr val="tx1"/>
+                      </a:solidFill>
+                      <a:prstDash val="solid"/>
+                      <a:round/>
+                      <a:headEnd type="none" w="med" len="med"/>
+                      <a:tailEnd type="none" w="med" len="med"/>
+                    </a:lnT>
+                    <a:lnB w="12700" cap="flat" cmpd="sng" algn="ctr">
+                      <a:solidFill>
+                        <a:schemeClr val="tx1"/>
+                      </a:solidFill>
+                      <a:prstDash val="solid"/>
+                      <a:round/>
+                      <a:headEnd type="none" w="med" len="med"/>
+                      <a:tailEnd type="none" w="med" len="med"/>
+                    </a:lnB>
+                    <a:solidFill>
+                      <a:srgbClr val="F1C7C8"/>
+                    </a:solidFill>
+                  </a:tcPr>
+                </a:tc>
+                <a:extLst>
+                  <a:ext uri="{0D108BD9-81ED-4DB2-BD59-A6C34878D82A}">
+                    <a16:rowId xmlns:a16="http://schemas.microsoft.com/office/drawing/2014/main" val="3866954559"/>
+                  </a:ext>
+                </a:extLst>
+              </a:tr>
+            </a:tbl>
+          </a:graphicData>
+        </a:graphic>
+      </p:graphicFrame>
     </p:spTree>
     <p:extLst>
       <p:ext uri="{BB962C8B-B14F-4D97-AF65-F5344CB8AC3E}">
@@ -23123,7 +23960,7 @@
         </p:nvSpPr>
         <p:spPr>
           <a:xfrm rot="18900000">
-            <a:off x="-2374508" y="-257741"/>
+            <a:off x="-2515366" y="-91745"/>
             <a:ext cx="5996354" cy="1943100"/>
           </a:xfrm>
           <a:prstGeom prst="rect">
@@ -23640,360 +24477,393 @@
           </a:p>
         </p:txBody>
       </p:sp>
-      <p:sp>
-        <p:nvSpPr>
-          <p:cNvPr id="2" name="Content Placeholder 2">
-            <a:extLst>
-              <a:ext uri="{FF2B5EF4-FFF2-40B4-BE49-F238E27FC236}">
-                <a16:creationId xmlns:a16="http://schemas.microsoft.com/office/drawing/2014/main" id="{853814B4-7351-955C-CA8F-F5D45E473999}"/>
-              </a:ext>
-            </a:extLst>
-          </p:cNvPr>
-          <p:cNvSpPr txBox="1">
-            <a:spLocks/>
-          </p:cNvSpPr>
-          <p:nvPr/>
-        </p:nvSpPr>
-        <p:spPr>
-          <a:xfrm>
-            <a:off x="838199" y="5212080"/>
-            <a:ext cx="4685275" cy="1206086"/>
-          </a:xfrm>
-          <a:prstGeom prst="rect">
-            <a:avLst/>
-          </a:prstGeom>
-          <a:ln w="28575">
-            <a:solidFill>
-              <a:schemeClr val="tx1"/>
-            </a:solidFill>
-          </a:ln>
-        </p:spPr>
-        <p:txBody>
-          <a:bodyPr vert="horz" lIns="91440" tIns="45720" rIns="91440" bIns="45720" rtlCol="0" anchor="ctr">
-            <a:normAutofit/>
-          </a:bodyPr>
-          <a:lstStyle>
-            <a:lvl1pPr marL="228600" indent="-228600" algn="l" defTabSz="914400" rtl="0" eaLnBrk="1" latinLnBrk="0" hangingPunct="1">
-              <a:lnSpc>
-                <a:spcPct val="90000"/>
-              </a:lnSpc>
-              <a:spcBef>
-                <a:spcPts val="1000"/>
-              </a:spcBef>
-              <a:buFont typeface="Arial" panose="020B0604020202020204" pitchFamily="34" charset="0"/>
-              <a:buChar char="•"/>
-              <a:defRPr sz="2800" kern="1200">
-                <a:solidFill>
-                  <a:schemeClr val="tx1"/>
-                </a:solidFill>
-                <a:latin typeface="+mn-lt"/>
-                <a:ea typeface="+mn-ea"/>
-                <a:cs typeface="+mn-cs"/>
-              </a:defRPr>
-            </a:lvl1pPr>
-            <a:lvl2pPr marL="685800" indent="-228600" algn="l" defTabSz="914400" rtl="0" eaLnBrk="1" latinLnBrk="0" hangingPunct="1">
-              <a:lnSpc>
-                <a:spcPct val="90000"/>
-              </a:lnSpc>
-              <a:spcBef>
-                <a:spcPts val="500"/>
-              </a:spcBef>
-              <a:buFont typeface="Arial" panose="020B0604020202020204" pitchFamily="34" charset="0"/>
-              <a:buChar char="•"/>
-              <a:defRPr sz="2400" kern="1200">
-                <a:solidFill>
-                  <a:schemeClr val="tx1"/>
-                </a:solidFill>
-                <a:latin typeface="+mn-lt"/>
-                <a:ea typeface="+mn-ea"/>
-                <a:cs typeface="+mn-cs"/>
-              </a:defRPr>
-            </a:lvl2pPr>
-            <a:lvl3pPr marL="1143000" indent="-228600" algn="l" defTabSz="914400" rtl="0" eaLnBrk="1" latinLnBrk="0" hangingPunct="1">
-              <a:lnSpc>
-                <a:spcPct val="90000"/>
-              </a:lnSpc>
-              <a:spcBef>
-                <a:spcPts val="500"/>
-              </a:spcBef>
-              <a:buFont typeface="Arial" panose="020B0604020202020204" pitchFamily="34" charset="0"/>
-              <a:buChar char="•"/>
-              <a:defRPr sz="2000" kern="1200">
-                <a:solidFill>
-                  <a:schemeClr val="tx1"/>
-                </a:solidFill>
-                <a:latin typeface="+mn-lt"/>
-                <a:ea typeface="+mn-ea"/>
-                <a:cs typeface="+mn-cs"/>
-              </a:defRPr>
-            </a:lvl3pPr>
-            <a:lvl4pPr marL="1600200" indent="-228600" algn="l" defTabSz="914400" rtl="0" eaLnBrk="1" latinLnBrk="0" hangingPunct="1">
-              <a:lnSpc>
-                <a:spcPct val="90000"/>
-              </a:lnSpc>
-              <a:spcBef>
-                <a:spcPts val="500"/>
-              </a:spcBef>
-              <a:buFont typeface="Arial" panose="020B0604020202020204" pitchFamily="34" charset="0"/>
-              <a:buChar char="•"/>
-              <a:defRPr sz="1800" kern="1200">
-                <a:solidFill>
-                  <a:schemeClr val="tx1"/>
-                </a:solidFill>
-                <a:latin typeface="+mn-lt"/>
-                <a:ea typeface="+mn-ea"/>
-                <a:cs typeface="+mn-cs"/>
-              </a:defRPr>
-            </a:lvl4pPr>
-            <a:lvl5pPr marL="2057400" indent="-228600" algn="l" defTabSz="914400" rtl="0" eaLnBrk="1" latinLnBrk="0" hangingPunct="1">
-              <a:lnSpc>
-                <a:spcPct val="90000"/>
-              </a:lnSpc>
-              <a:spcBef>
-                <a:spcPts val="500"/>
-              </a:spcBef>
-              <a:buFont typeface="Arial" panose="020B0604020202020204" pitchFamily="34" charset="0"/>
-              <a:buChar char="•"/>
-              <a:defRPr sz="1800" kern="1200">
-                <a:solidFill>
-                  <a:schemeClr val="tx1"/>
-                </a:solidFill>
-                <a:latin typeface="+mn-lt"/>
-                <a:ea typeface="+mn-ea"/>
-                <a:cs typeface="+mn-cs"/>
-              </a:defRPr>
-            </a:lvl5pPr>
-            <a:lvl6pPr marL="2514600" indent="-228600" algn="l" defTabSz="914400" rtl="0" eaLnBrk="1" latinLnBrk="0" hangingPunct="1">
-              <a:lnSpc>
-                <a:spcPct val="90000"/>
-              </a:lnSpc>
-              <a:spcBef>
-                <a:spcPts val="500"/>
-              </a:spcBef>
-              <a:buFont typeface="Arial" panose="020B0604020202020204" pitchFamily="34" charset="0"/>
-              <a:buChar char="•"/>
-              <a:defRPr sz="1800" kern="1200">
-                <a:solidFill>
-                  <a:schemeClr val="tx1"/>
-                </a:solidFill>
-                <a:latin typeface="+mn-lt"/>
-                <a:ea typeface="+mn-ea"/>
-                <a:cs typeface="+mn-cs"/>
-              </a:defRPr>
-            </a:lvl6pPr>
-            <a:lvl7pPr marL="2971800" indent="-228600" algn="l" defTabSz="914400" rtl="0" eaLnBrk="1" latinLnBrk="0" hangingPunct="1">
-              <a:lnSpc>
-                <a:spcPct val="90000"/>
-              </a:lnSpc>
-              <a:spcBef>
-                <a:spcPts val="500"/>
-              </a:spcBef>
-              <a:buFont typeface="Arial" panose="020B0604020202020204" pitchFamily="34" charset="0"/>
-              <a:buChar char="•"/>
-              <a:defRPr sz="1800" kern="1200">
-                <a:solidFill>
-                  <a:schemeClr val="tx1"/>
-                </a:solidFill>
-                <a:latin typeface="+mn-lt"/>
-                <a:ea typeface="+mn-ea"/>
-                <a:cs typeface="+mn-cs"/>
-              </a:defRPr>
-            </a:lvl7pPr>
-            <a:lvl8pPr marL="3429000" indent="-228600" algn="l" defTabSz="914400" rtl="0" eaLnBrk="1" latinLnBrk="0" hangingPunct="1">
-              <a:lnSpc>
-                <a:spcPct val="90000"/>
-              </a:lnSpc>
-              <a:spcBef>
-                <a:spcPts val="500"/>
-              </a:spcBef>
-              <a:buFont typeface="Arial" panose="020B0604020202020204" pitchFamily="34" charset="0"/>
-              <a:buChar char="•"/>
-              <a:defRPr sz="1800" kern="1200">
-                <a:solidFill>
-                  <a:schemeClr val="tx1"/>
-                </a:solidFill>
-                <a:latin typeface="+mn-lt"/>
-                <a:ea typeface="+mn-ea"/>
-                <a:cs typeface="+mn-cs"/>
-              </a:defRPr>
-            </a:lvl8pPr>
-            <a:lvl9pPr marL="3886200" indent="-228600" algn="l" defTabSz="914400" rtl="0" eaLnBrk="1" latinLnBrk="0" hangingPunct="1">
-              <a:lnSpc>
-                <a:spcPct val="90000"/>
-              </a:lnSpc>
-              <a:spcBef>
-                <a:spcPts val="500"/>
-              </a:spcBef>
-              <a:buFont typeface="Arial" panose="020B0604020202020204" pitchFamily="34" charset="0"/>
-              <a:buChar char="•"/>
-              <a:defRPr sz="1800" kern="1200">
-                <a:solidFill>
-                  <a:schemeClr val="tx1"/>
-                </a:solidFill>
-                <a:latin typeface="+mn-lt"/>
-                <a:ea typeface="+mn-ea"/>
-                <a:cs typeface="+mn-cs"/>
-              </a:defRPr>
-            </a:lvl9pPr>
-          </a:lstStyle>
-          <a:p>
-            <a:pPr marL="0" indent="0">
-              <a:buFont typeface="Arial" panose="020B0604020202020204" pitchFamily="34" charset="0"/>
-              <a:buNone/>
-            </a:pPr>
-            <a:r>
-              <a:rPr lang="it-IT" sz="2000" dirty="0">
-                <a:latin typeface="Bahnschrift SemiCondensed" panose="020B0502040204020203" pitchFamily="34" charset="0"/>
-              </a:rPr>
-              <a:t>Future </a:t>
-            </a:r>
-            <a:r>
-              <a:rPr lang="it-IT" sz="2000" dirty="0" err="1">
-                <a:latin typeface="Bahnschrift SemiCondensed" panose="020B0502040204020203" pitchFamily="34" charset="0"/>
-              </a:rPr>
-              <a:t>improvement</a:t>
-            </a:r>
-            <a:r>
-              <a:rPr lang="it-IT" sz="2000" dirty="0">
-                <a:latin typeface="Bahnschrift SemiCondensed" panose="020B0502040204020203" pitchFamily="34" charset="0"/>
-              </a:rPr>
-              <a:t> - Consensus </a:t>
-            </a:r>
-            <a:r>
-              <a:rPr lang="it-IT" sz="2000" dirty="0" err="1">
-                <a:latin typeface="Bahnschrift SemiCondensed" panose="020B0502040204020203" pitchFamily="34" charset="0"/>
-              </a:rPr>
-              <a:t>could</a:t>
-            </a:r>
-            <a:r>
-              <a:rPr lang="it-IT" sz="2000" dirty="0">
-                <a:latin typeface="Bahnschrift SemiCondensed" panose="020B0502040204020203" pitchFamily="34" charset="0"/>
-              </a:rPr>
-              <a:t> be </a:t>
-            </a:r>
-            <a:r>
-              <a:rPr lang="it-IT" sz="2000" dirty="0" err="1">
-                <a:latin typeface="Bahnschrift SemiCondensed" panose="020B0502040204020203" pitchFamily="34" charset="0"/>
-              </a:rPr>
-              <a:t>dynamically</a:t>
-            </a:r>
-            <a:r>
-              <a:rPr lang="it-IT" sz="2000" dirty="0">
-                <a:latin typeface="Bahnschrift SemiCondensed" panose="020B0502040204020203" pitchFamily="34" charset="0"/>
-              </a:rPr>
-              <a:t> </a:t>
-            </a:r>
-            <a:r>
-              <a:rPr lang="it-IT" sz="2000" dirty="0" err="1">
-                <a:latin typeface="Bahnschrift SemiCondensed" panose="020B0502040204020203" pitchFamily="34" charset="0"/>
-              </a:rPr>
-              <a:t>computed</a:t>
-            </a:r>
-            <a:r>
-              <a:rPr lang="it-IT" sz="2000" dirty="0">
-                <a:latin typeface="Bahnschrift SemiCondensed" panose="020B0502040204020203" pitchFamily="34" charset="0"/>
-              </a:rPr>
-              <a:t> </a:t>
-            </a:r>
-            <a:r>
-              <a:rPr lang="it-IT" sz="2000" dirty="0" err="1">
-                <a:latin typeface="Bahnschrift SemiCondensed" panose="020B0502040204020203" pitchFamily="34" charset="0"/>
-              </a:rPr>
-              <a:t>at</a:t>
-            </a:r>
-            <a:r>
-              <a:rPr lang="it-IT" sz="2000" dirty="0">
-                <a:latin typeface="Bahnschrift SemiCondensed" panose="020B0502040204020203" pitchFamily="34" charset="0"/>
-              </a:rPr>
-              <a:t> </a:t>
-            </a:r>
-            <a:r>
-              <a:rPr lang="it-IT" sz="2000" dirty="0" err="1">
-                <a:latin typeface="Bahnschrift SemiCondensed" panose="020B0502040204020203" pitchFamily="34" charset="0"/>
-              </a:rPr>
-              <a:t>every</a:t>
-            </a:r>
-            <a:r>
-              <a:rPr lang="it-IT" sz="2000" dirty="0">
-                <a:latin typeface="Bahnschrift SemiCondensed" panose="020B0502040204020203" pitchFamily="34" charset="0"/>
-              </a:rPr>
-              <a:t> step of the </a:t>
-            </a:r>
-            <a:r>
-              <a:rPr lang="it-IT" sz="2000" dirty="0" err="1">
-                <a:latin typeface="Bahnschrift SemiCondensed" panose="020B0502040204020203" pitchFamily="34" charset="0"/>
-              </a:rPr>
-              <a:t>iteration</a:t>
-            </a:r>
-            <a:r>
-              <a:rPr lang="it-IT" sz="2000" dirty="0">
-                <a:latin typeface="Bahnschrift SemiCondensed" panose="020B0502040204020203" pitchFamily="34" charset="0"/>
-              </a:rPr>
-              <a:t> </a:t>
-            </a:r>
-            <a:r>
-              <a:rPr lang="it-IT" sz="2000" dirty="0" err="1">
-                <a:latin typeface="Bahnschrift SemiCondensed" panose="020B0502040204020203" pitchFamily="34" charset="0"/>
-              </a:rPr>
-              <a:t>until</a:t>
-            </a:r>
-            <a:r>
-              <a:rPr lang="it-IT" sz="2000" dirty="0">
-                <a:latin typeface="Bahnschrift SemiCondensed" panose="020B0502040204020203" pitchFamily="34" charset="0"/>
-              </a:rPr>
-              <a:t> </a:t>
-            </a:r>
-            <a:r>
-              <a:rPr lang="it-IT" sz="2000" dirty="0" err="1">
-                <a:latin typeface="Bahnschrift SemiCondensed" panose="020B0502040204020203" pitchFamily="34" charset="0"/>
-              </a:rPr>
-              <a:t>every</a:t>
-            </a:r>
-            <a:r>
-              <a:rPr lang="it-IT" sz="2000" dirty="0">
-                <a:latin typeface="Bahnschrift SemiCondensed" panose="020B0502040204020203" pitchFamily="34" charset="0"/>
-              </a:rPr>
-              <a:t> agent </a:t>
-            </a:r>
-            <a:r>
-              <a:rPr lang="it-IT" sz="2000" dirty="0" err="1">
-                <a:latin typeface="Bahnschrift SemiCondensed" panose="020B0502040204020203" pitchFamily="34" charset="0"/>
-              </a:rPr>
-              <a:t>is</a:t>
-            </a:r>
-            <a:r>
-              <a:rPr lang="it-IT" sz="2000" dirty="0">
-                <a:latin typeface="Bahnschrift SemiCondensed" panose="020B0502040204020203" pitchFamily="34" charset="0"/>
-              </a:rPr>
-              <a:t> in </a:t>
-            </a:r>
-            <a:r>
-              <a:rPr lang="it-IT" sz="2000" dirty="0" err="1">
-                <a:latin typeface="Bahnschrift SemiCondensed" panose="020B0502040204020203" pitchFamily="34" charset="0"/>
-              </a:rPr>
-              <a:t>its</a:t>
-            </a:r>
-            <a:r>
-              <a:rPr lang="it-IT" sz="2000" dirty="0">
-                <a:latin typeface="Bahnschrift SemiCondensed" panose="020B0502040204020203" pitchFamily="34" charset="0"/>
-              </a:rPr>
-              <a:t> </a:t>
-            </a:r>
-            <a:r>
-              <a:rPr lang="it-IT" sz="2000" dirty="0" err="1">
-                <a:latin typeface="Bahnschrift SemiCondensed" panose="020B0502040204020203" pitchFamily="34" charset="0"/>
-              </a:rPr>
-              <a:t>proximity</a:t>
-            </a:r>
-            <a:r>
-              <a:rPr lang="it-IT" sz="2000" dirty="0">
-                <a:latin typeface="Bahnschrift SemiCondensed" panose="020B0502040204020203" pitchFamily="34" charset="0"/>
-              </a:rPr>
-              <a:t>.</a:t>
-            </a:r>
-          </a:p>
-        </p:txBody>
-      </p:sp>
+      <mc:AlternateContent xmlns:mc="http://schemas.openxmlformats.org/markup-compatibility/2006">
+        <mc:Choice xmlns:a14="http://schemas.microsoft.com/office/drawing/2010/main" Requires="a14">
+          <p:sp>
+            <p:nvSpPr>
+              <p:cNvPr id="7" name="TextBox 6">
+                <a:extLst>
+                  <a:ext uri="{FF2B5EF4-FFF2-40B4-BE49-F238E27FC236}">
+                    <a16:creationId xmlns:a16="http://schemas.microsoft.com/office/drawing/2014/main" id="{7B946EB3-6FD2-E8EC-EE12-E34072E34710}"/>
+                  </a:ext>
+                </a:extLst>
+              </p:cNvPr>
+              <p:cNvSpPr txBox="1"/>
+              <p:nvPr/>
+            </p:nvSpPr>
+            <p:spPr>
+              <a:xfrm>
+                <a:off x="-1076785" y="4616892"/>
+                <a:ext cx="5166360" cy="972702"/>
+              </a:xfrm>
+              <a:prstGeom prst="rect">
+                <a:avLst/>
+              </a:prstGeom>
+              <a:noFill/>
+            </p:spPr>
+            <p:txBody>
+              <a:bodyPr wrap="square">
+                <a:spAutoFit/>
+              </a:bodyPr>
+              <a:lstStyle/>
+              <a:p>
+                <a:pPr/>
+                <a:r>
+                  <a:rPr lang="en-GB" dirty="0"/>
+                  <a:t>			P </a:t>
+                </a:r>
+                <a14:m>
+                  <m:oMath xmlns:m="http://schemas.openxmlformats.org/officeDocument/2006/math">
+                    <m:r>
+                      <a:rPr lang="en-GB" i="0">
+                        <a:latin typeface="Cambria Math" panose="02040503050406030204" pitchFamily="18" charset="0"/>
+                      </a:rPr>
+                      <m:t>=</m:t>
+                    </m:r>
+                    <m:d>
+                      <m:dPr>
+                        <m:begChr m:val="["/>
+                        <m:endChr m:val="]"/>
+                        <m:ctrlPr>
+                          <a:rPr lang="en-GB" i="1">
+                            <a:latin typeface="Cambria Math" panose="02040503050406030204" pitchFamily="18" charset="0"/>
+                          </a:rPr>
+                        </m:ctrlPr>
+                      </m:dPr>
+                      <m:e>
+                        <m:m>
+                          <m:mPr>
+                            <m:plcHide m:val="on"/>
+                            <m:mcs>
+                              <m:mc>
+                                <m:mcPr>
+                                  <m:count m:val="3"/>
+                                  <m:mcJc m:val="center"/>
+                                </m:mcPr>
+                              </m:mc>
+                            </m:mcs>
+                            <m:ctrlPr>
+                              <a:rPr lang="en-GB" i="1">
+                                <a:solidFill>
+                                  <a:srgbClr val="836967"/>
+                                </a:solidFill>
+                                <a:latin typeface="Cambria Math" panose="02040503050406030204" pitchFamily="18" charset="0"/>
+                              </a:rPr>
+                            </m:ctrlPr>
+                          </m:mPr>
+                          <m:mr>
+                            <m:e>
+                              <m:f>
+                                <m:fPr>
+                                  <m:type m:val="lin"/>
+                                  <m:ctrlPr>
+                                    <a:rPr lang="en-GB" i="1">
+                                      <a:latin typeface="Cambria Math" panose="02040503050406030204" pitchFamily="18" charset="0"/>
+                                    </a:rPr>
+                                  </m:ctrlPr>
+                                </m:fPr>
+                                <m:num>
+                                  <m:r>
+                                    <a:rPr lang="en-GB" i="0">
+                                      <a:latin typeface="Cambria Math" panose="02040503050406030204" pitchFamily="18" charset="0"/>
+                                    </a:rPr>
+                                    <m:t>1</m:t>
+                                  </m:r>
+                                </m:num>
+                                <m:den>
+                                  <m:r>
+                                    <a:rPr lang="en-GB" i="0">
+                                      <a:latin typeface="Cambria Math" panose="02040503050406030204" pitchFamily="18" charset="0"/>
+                                    </a:rPr>
+                                    <m:t>3</m:t>
+                                  </m:r>
+                                </m:den>
+                              </m:f>
+                            </m:e>
+                            <m:e>
+                              <m:f>
+                                <m:fPr>
+                                  <m:type m:val="lin"/>
+                                  <m:ctrlPr>
+                                    <a:rPr lang="en-GB" i="1">
+                                      <a:latin typeface="Cambria Math" panose="02040503050406030204" pitchFamily="18" charset="0"/>
+                                    </a:rPr>
+                                  </m:ctrlPr>
+                                </m:fPr>
+                                <m:num>
+                                  <m:r>
+                                    <a:rPr lang="en-GB" i="0">
+                                      <a:latin typeface="Cambria Math" panose="02040503050406030204" pitchFamily="18" charset="0"/>
+                                    </a:rPr>
+                                    <m:t>1</m:t>
+                                  </m:r>
+                                </m:num>
+                                <m:den>
+                                  <m:r>
+                                    <a:rPr lang="en-GB" i="0">
+                                      <a:latin typeface="Cambria Math" panose="02040503050406030204" pitchFamily="18" charset="0"/>
+                                    </a:rPr>
+                                    <m:t>3</m:t>
+                                  </m:r>
+                                </m:den>
+                              </m:f>
+                            </m:e>
+                            <m:e>
+                              <m:f>
+                                <m:fPr>
+                                  <m:type m:val="lin"/>
+                                  <m:ctrlPr>
+                                    <a:rPr lang="en-GB" i="1">
+                                      <a:latin typeface="Cambria Math" panose="02040503050406030204" pitchFamily="18" charset="0"/>
+                                    </a:rPr>
+                                  </m:ctrlPr>
+                                </m:fPr>
+                                <m:num>
+                                  <m:r>
+                                    <a:rPr lang="en-GB" i="0">
+                                      <a:latin typeface="Cambria Math" panose="02040503050406030204" pitchFamily="18" charset="0"/>
+                                    </a:rPr>
+                                    <m:t>1</m:t>
+                                  </m:r>
+                                </m:num>
+                                <m:den>
+                                  <m:r>
+                                    <a:rPr lang="en-GB" i="0">
+                                      <a:latin typeface="Cambria Math" panose="02040503050406030204" pitchFamily="18" charset="0"/>
+                                    </a:rPr>
+                                    <m:t>3</m:t>
+                                  </m:r>
+                                </m:den>
+                              </m:f>
+                            </m:e>
+                          </m:mr>
+                          <m:mr>
+                            <m:e>
+                              <m:f>
+                                <m:fPr>
+                                  <m:type m:val="lin"/>
+                                  <m:ctrlPr>
+                                    <a:rPr lang="en-GB" i="1">
+                                      <a:latin typeface="Cambria Math" panose="02040503050406030204" pitchFamily="18" charset="0"/>
+                                    </a:rPr>
+                                  </m:ctrlPr>
+                                </m:fPr>
+                                <m:num>
+                                  <m:r>
+                                    <a:rPr lang="en-GB" i="0">
+                                      <a:latin typeface="Cambria Math" panose="02040503050406030204" pitchFamily="18" charset="0"/>
+                                    </a:rPr>
+                                    <m:t>1</m:t>
+                                  </m:r>
+                                </m:num>
+                                <m:den>
+                                  <m:r>
+                                    <a:rPr lang="en-GB" i="0">
+                                      <a:latin typeface="Cambria Math" panose="02040503050406030204" pitchFamily="18" charset="0"/>
+                                    </a:rPr>
+                                    <m:t>3</m:t>
+                                  </m:r>
+                                </m:den>
+                              </m:f>
+                            </m:e>
+                            <m:e>
+                              <m:f>
+                                <m:fPr>
+                                  <m:type m:val="lin"/>
+                                  <m:ctrlPr>
+                                    <a:rPr lang="en-GB" i="1">
+                                      <a:latin typeface="Cambria Math" panose="02040503050406030204" pitchFamily="18" charset="0"/>
+                                    </a:rPr>
+                                  </m:ctrlPr>
+                                </m:fPr>
+                                <m:num>
+                                  <m:r>
+                                    <a:rPr lang="en-GB" i="0">
+                                      <a:latin typeface="Cambria Math" panose="02040503050406030204" pitchFamily="18" charset="0"/>
+                                    </a:rPr>
+                                    <m:t>1</m:t>
+                                  </m:r>
+                                </m:num>
+                                <m:den>
+                                  <m:r>
+                                    <a:rPr lang="en-GB" i="0">
+                                      <a:latin typeface="Cambria Math" panose="02040503050406030204" pitchFamily="18" charset="0"/>
+                                    </a:rPr>
+                                    <m:t>3</m:t>
+                                  </m:r>
+                                </m:den>
+                              </m:f>
+                            </m:e>
+                            <m:e>
+                              <m:f>
+                                <m:fPr>
+                                  <m:type m:val="lin"/>
+                                  <m:ctrlPr>
+                                    <a:rPr lang="en-GB" i="1">
+                                      <a:latin typeface="Cambria Math" panose="02040503050406030204" pitchFamily="18" charset="0"/>
+                                    </a:rPr>
+                                  </m:ctrlPr>
+                                </m:fPr>
+                                <m:num>
+                                  <m:r>
+                                    <a:rPr lang="en-GB" i="0">
+                                      <a:latin typeface="Cambria Math" panose="02040503050406030204" pitchFamily="18" charset="0"/>
+                                    </a:rPr>
+                                    <m:t>1</m:t>
+                                  </m:r>
+                                </m:num>
+                                <m:den>
+                                  <m:r>
+                                    <a:rPr lang="en-GB" i="0">
+                                      <a:latin typeface="Cambria Math" panose="02040503050406030204" pitchFamily="18" charset="0"/>
+                                    </a:rPr>
+                                    <m:t>3</m:t>
+                                  </m:r>
+                                </m:den>
+                              </m:f>
+                            </m:e>
+                          </m:mr>
+                          <m:mr>
+                            <m:e>
+                              <m:f>
+                                <m:fPr>
+                                  <m:type m:val="lin"/>
+                                  <m:ctrlPr>
+                                    <a:rPr lang="en-GB" i="1">
+                                      <a:latin typeface="Cambria Math" panose="02040503050406030204" pitchFamily="18" charset="0"/>
+                                    </a:rPr>
+                                  </m:ctrlPr>
+                                </m:fPr>
+                                <m:num>
+                                  <m:r>
+                                    <a:rPr lang="en-GB" i="0">
+                                      <a:latin typeface="Cambria Math" panose="02040503050406030204" pitchFamily="18" charset="0"/>
+                                    </a:rPr>
+                                    <m:t>1</m:t>
+                                  </m:r>
+                                </m:num>
+                                <m:den>
+                                  <m:r>
+                                    <a:rPr lang="en-GB" i="0">
+                                      <a:latin typeface="Cambria Math" panose="02040503050406030204" pitchFamily="18" charset="0"/>
+                                    </a:rPr>
+                                    <m:t>3</m:t>
+                                  </m:r>
+                                </m:den>
+                              </m:f>
+                            </m:e>
+                            <m:e>
+                              <m:f>
+                                <m:fPr>
+                                  <m:type m:val="lin"/>
+                                  <m:ctrlPr>
+                                    <a:rPr lang="en-GB" i="1">
+                                      <a:latin typeface="Cambria Math" panose="02040503050406030204" pitchFamily="18" charset="0"/>
+                                    </a:rPr>
+                                  </m:ctrlPr>
+                                </m:fPr>
+                                <m:num>
+                                  <m:r>
+                                    <a:rPr lang="en-GB" i="0">
+                                      <a:latin typeface="Cambria Math" panose="02040503050406030204" pitchFamily="18" charset="0"/>
+                                    </a:rPr>
+                                    <m:t>1</m:t>
+                                  </m:r>
+                                </m:num>
+                                <m:den>
+                                  <m:r>
+                                    <a:rPr lang="en-GB" i="0">
+                                      <a:latin typeface="Cambria Math" panose="02040503050406030204" pitchFamily="18" charset="0"/>
+                                    </a:rPr>
+                                    <m:t>3</m:t>
+                                  </m:r>
+                                </m:den>
+                              </m:f>
+                            </m:e>
+                            <m:e>
+                              <m:f>
+                                <m:fPr>
+                                  <m:type m:val="lin"/>
+                                  <m:ctrlPr>
+                                    <a:rPr lang="en-GB" i="1">
+                                      <a:latin typeface="Cambria Math" panose="02040503050406030204" pitchFamily="18" charset="0"/>
+                                    </a:rPr>
+                                  </m:ctrlPr>
+                                </m:fPr>
+                                <m:num>
+                                  <m:r>
+                                    <a:rPr lang="en-GB" i="0">
+                                      <a:latin typeface="Cambria Math" panose="02040503050406030204" pitchFamily="18" charset="0"/>
+                                    </a:rPr>
+                                    <m:t>1</m:t>
+                                  </m:r>
+                                </m:num>
+                                <m:den>
+                                  <m:r>
+                                    <a:rPr lang="en-GB" i="0">
+                                      <a:latin typeface="Cambria Math" panose="02040503050406030204" pitchFamily="18" charset="0"/>
+                                    </a:rPr>
+                                    <m:t>3</m:t>
+                                  </m:r>
+                                </m:den>
+                              </m:f>
+                            </m:e>
+                          </m:mr>
+                        </m:m>
+                      </m:e>
+                    </m:d>
+                  </m:oMath>
+                </a14:m>
+                <a:endParaRPr lang="en-GB" dirty="0"/>
+              </a:p>
+            </p:txBody>
+          </p:sp>
+        </mc:Choice>
+        <mc:Fallback>
+          <p:sp>
+            <p:nvSpPr>
+              <p:cNvPr id="7" name="TextBox 6">
+                <a:extLst>
+                  <a:ext uri="{FF2B5EF4-FFF2-40B4-BE49-F238E27FC236}">
+                    <a16:creationId xmlns:a16="http://schemas.microsoft.com/office/drawing/2014/main" id="{7B946EB3-6FD2-E8EC-EE12-E34072E34710}"/>
+                  </a:ext>
+                </a:extLst>
+              </p:cNvPr>
+              <p:cNvSpPr txBox="1">
+                <a:spLocks noRot="1" noChangeAspect="1" noMove="1" noResize="1" noEditPoints="1" noAdjustHandles="1" noChangeArrowheads="1" noChangeShapeType="1" noTextEdit="1"/>
+              </p:cNvSpPr>
+              <p:nvPr/>
+            </p:nvSpPr>
+            <p:spPr>
+              <a:xfrm>
+                <a:off x="-1076785" y="4616892"/>
+                <a:ext cx="5166360" cy="972702"/>
+              </a:xfrm>
+              <a:prstGeom prst="rect">
+                <a:avLst/>
+              </a:prstGeom>
+              <a:blipFill>
+                <a:blip r:embed="rId2"/>
+                <a:stretch>
+                  <a:fillRect/>
+                </a:stretch>
+              </a:blipFill>
+            </p:spPr>
+            <p:txBody>
+              <a:bodyPr/>
+              <a:lstStyle/>
+              <a:p>
+                <a:r>
+                  <a:rPr lang="en-GB">
+                    <a:noFill/>
+                  </a:rPr>
+                  <a:t> </a:t>
+                </a:r>
+              </a:p>
+            </p:txBody>
+          </p:sp>
+        </mc:Fallback>
+      </mc:AlternateContent>
     </p:spTree>
     <p:extLst>
       <p:ext uri="{BB962C8B-B14F-4D97-AF65-F5344CB8AC3E}">

</xml_diff>